<commit_message>
added objects in Chapter-1/Lesson-6
</commit_message>
<xml_diff>
--- a/Chapter-1/Lesson-6/Lesson-6.pptx
+++ b/Chapter-1/Lesson-6/Lesson-6.pptx
@@ -5,23 +5,22 @@
     <p:sldMasterId id="2147483648" r:id="rId1"/>
   </p:sldMasterIdLst>
   <p:notesMasterIdLst>
-    <p:notesMasterId r:id="rId8"/>
+    <p:notesMasterId r:id="rId7"/>
   </p:notesMasterIdLst>
   <p:sldIdLst>
     <p:sldId id="256" r:id="rId2"/>
     <p:sldId id="332" r:id="rId3"/>
-    <p:sldId id="327" r:id="rId4"/>
-    <p:sldId id="333" r:id="rId5"/>
-    <p:sldId id="264" r:id="rId6"/>
-    <p:sldId id="263" r:id="rId7"/>
+    <p:sldId id="333" r:id="rId4"/>
+    <p:sldId id="264" r:id="rId5"/>
+    <p:sldId id="263" r:id="rId6"/>
   </p:sldIdLst>
   <p:sldSz cx="18288000" cy="10287000"/>
   <p:notesSz cx="6858000" cy="9144000"/>
   <p:embeddedFontLst>
     <p:embeddedFont>
       <p:font typeface="Montserrat" panose="00000500000000000000" pitchFamily="2" charset="0"/>
-      <p:regular r:id="rId9"/>
-      <p:bold r:id="rId10"/>
+      <p:regular r:id="rId8"/>
+      <p:bold r:id="rId9"/>
     </p:embeddedFont>
   </p:embeddedFontLst>
   <p:defaultTextStyle>
@@ -220,7 +219,7 @@
           <a:p>
             <a:fld id="{B7268E1E-0E44-426D-905E-8AD9B19D2182}" type="datetimeFigureOut">
               <a:rPr lang="cs-CZ" smtClean="0"/>
-              <a:t>25.03.2025</a:t>
+              <a:t>28.03.2025</a:t>
             </a:fld>
             <a:endParaRPr lang="cs-CZ"/>
           </a:p>
@@ -1117,7 +1116,7 @@
             <a:fld id="{1D8BD707-D9CF-40AE-B4C6-C98DA3205C09}" type="datetimeFigureOut">
               <a:rPr lang="en-US" smtClean="0"/>
               <a:pPr/>
-              <a:t>3/25/2025</a:t>
+              <a:t>3/28/2025</a:t>
             </a:fld>
             <a:endParaRPr lang="en-US"/>
           </a:p>
@@ -1282,7 +1281,7 @@
             <a:fld id="{1D8BD707-D9CF-40AE-B4C6-C98DA3205C09}" type="datetimeFigureOut">
               <a:rPr lang="en-US" smtClean="0"/>
               <a:pPr/>
-              <a:t>3/25/2025</a:t>
+              <a:t>3/28/2025</a:t>
             </a:fld>
             <a:endParaRPr lang="en-US"/>
           </a:p>
@@ -1457,7 +1456,7 @@
             <a:fld id="{1D8BD707-D9CF-40AE-B4C6-C98DA3205C09}" type="datetimeFigureOut">
               <a:rPr lang="en-US" smtClean="0"/>
               <a:pPr/>
-              <a:t>3/25/2025</a:t>
+              <a:t>3/28/2025</a:t>
             </a:fld>
             <a:endParaRPr lang="en-US"/>
           </a:p>
@@ -1981,7 +1980,7 @@
             <a:fld id="{1D8BD707-D9CF-40AE-B4C6-C98DA3205C09}" type="datetimeFigureOut">
               <a:rPr lang="en-US" smtClean="0"/>
               <a:pPr/>
-              <a:t>3/25/2025</a:t>
+              <a:t>3/28/2025</a:t>
             </a:fld>
             <a:endParaRPr lang="en-US"/>
           </a:p>
@@ -2223,7 +2222,7 @@
             <a:fld id="{1D8BD707-D9CF-40AE-B4C6-C98DA3205C09}" type="datetimeFigureOut">
               <a:rPr lang="en-US" smtClean="0"/>
               <a:pPr/>
-              <a:t>3/25/2025</a:t>
+              <a:t>3/28/2025</a:t>
             </a:fld>
             <a:endParaRPr lang="en-US"/>
           </a:p>
@@ -2505,7 +2504,7 @@
             <a:fld id="{1D8BD707-D9CF-40AE-B4C6-C98DA3205C09}" type="datetimeFigureOut">
               <a:rPr lang="en-US" smtClean="0"/>
               <a:pPr/>
-              <a:t>3/25/2025</a:t>
+              <a:t>3/28/2025</a:t>
             </a:fld>
             <a:endParaRPr lang="en-US"/>
           </a:p>
@@ -2921,7 +2920,7 @@
             <a:fld id="{1D8BD707-D9CF-40AE-B4C6-C98DA3205C09}" type="datetimeFigureOut">
               <a:rPr lang="en-US" smtClean="0"/>
               <a:pPr/>
-              <a:t>3/25/2025</a:t>
+              <a:t>3/28/2025</a:t>
             </a:fld>
             <a:endParaRPr lang="en-US"/>
           </a:p>
@@ -3035,7 +3034,7 @@
             <a:fld id="{1D8BD707-D9CF-40AE-B4C6-C98DA3205C09}" type="datetimeFigureOut">
               <a:rPr lang="en-US" smtClean="0"/>
               <a:pPr/>
-              <a:t>3/25/2025</a:t>
+              <a:t>3/28/2025</a:t>
             </a:fld>
             <a:endParaRPr lang="en-US"/>
           </a:p>
@@ -3127,7 +3126,7 @@
             <a:fld id="{1D8BD707-D9CF-40AE-B4C6-C98DA3205C09}" type="datetimeFigureOut">
               <a:rPr lang="en-US" smtClean="0"/>
               <a:pPr/>
-              <a:t>3/25/2025</a:t>
+              <a:t>3/28/2025</a:t>
             </a:fld>
             <a:endParaRPr lang="en-US"/>
           </a:p>
@@ -3399,7 +3398,7 @@
             <a:fld id="{1D8BD707-D9CF-40AE-B4C6-C98DA3205C09}" type="datetimeFigureOut">
               <a:rPr lang="en-US" smtClean="0"/>
               <a:pPr/>
-              <a:t>3/25/2025</a:t>
+              <a:t>3/28/2025</a:t>
             </a:fld>
             <a:endParaRPr lang="en-US"/>
           </a:p>
@@ -3648,7 +3647,7 @@
             <a:fld id="{1D8BD707-D9CF-40AE-B4C6-C98DA3205C09}" type="datetimeFigureOut">
               <a:rPr lang="en-US" smtClean="0"/>
               <a:pPr/>
-              <a:t>3/25/2025</a:t>
+              <a:t>3/28/2025</a:t>
             </a:fld>
             <a:endParaRPr lang="en-US"/>
           </a:p>
@@ -3856,7 +3855,7 @@
             <a:fld id="{1D8BD707-D9CF-40AE-B4C6-C98DA3205C09}" type="datetimeFigureOut">
               <a:rPr lang="en-US" smtClean="0"/>
               <a:pPr/>
-              <a:t>3/25/2025</a:t>
+              <a:t>3/28/2025</a:t>
             </a:fld>
             <a:endParaRPr lang="en-US"/>
           </a:p>
@@ -4681,7 +4680,15 @@
                   <a:schemeClr val="bg1"/>
                 </a:solidFill>
               </a:rPr>
-              <a:t> - Data Types, Objects, Arrays</a:t>
+              <a:t> </a:t>
+            </a:r>
+            <a:r>
+              <a:rPr lang="en-IN" sz="3600" b="1">
+                <a:solidFill>
+                  <a:schemeClr val="bg1"/>
+                </a:solidFill>
+              </a:rPr>
+              <a:t>-Objects</a:t>
             </a:r>
             <a:br>
               <a:rPr lang="en-GB" sz="3600" b="1" dirty="0">
@@ -5126,547 +5133,6 @@
         </p:nvSpPr>
         <p:spPr>
           <a:xfrm>
-            <a:off x="1028700" y="1213130"/>
-            <a:ext cx="11391900" cy="1500411"/>
-          </a:xfrm>
-          <a:prstGeom prst="rect">
-            <a:avLst/>
-          </a:prstGeom>
-          <a:noFill/>
-        </p:spPr>
-        <p:txBody>
-          <a:bodyPr wrap="square" rtlCol="0">
-            <a:spAutoFit/>
-          </a:bodyPr>
-          <a:lstStyle/>
-          <a:p>
-            <a:pPr>
-              <a:spcAft>
-                <a:spcPts val="900"/>
-              </a:spcAft>
-            </a:pPr>
-            <a:r>
-              <a:rPr lang="en-IN" sz="4200" b="1" dirty="0"/>
-              <a:t>ARRAYS</a:t>
-            </a:r>
-            <a:endParaRPr lang="ru-RU" sz="1200" b="1" dirty="0"/>
-          </a:p>
-          <a:p>
-            <a:endParaRPr lang="en-IN" sz="4200" b="1" dirty="0"/>
-          </a:p>
-        </p:txBody>
-      </p:sp>
-      <p:sp>
-        <p:nvSpPr>
-          <p:cNvPr id="15" name="TextBox 14">
-            <a:extLst>
-              <a:ext uri="{FF2B5EF4-FFF2-40B4-BE49-F238E27FC236}">
-                <a16:creationId xmlns:a16="http://schemas.microsoft.com/office/drawing/2014/main" id="{3F4FC40A-0117-EECE-55EB-94E47B212002}"/>
-              </a:ext>
-            </a:extLst>
-          </p:cNvPr>
-          <p:cNvSpPr txBox="1"/>
-          <p:nvPr/>
-        </p:nvSpPr>
-        <p:spPr>
-          <a:xfrm>
-            <a:off x="998220" y="1963336"/>
-            <a:ext cx="16109927" cy="4161460"/>
-          </a:xfrm>
-          <a:prstGeom prst="rect">
-            <a:avLst/>
-          </a:prstGeom>
-          <a:noFill/>
-        </p:spPr>
-        <p:txBody>
-          <a:bodyPr wrap="square" rtlCol="0">
-            <a:spAutoFit/>
-          </a:bodyPr>
-          <a:lstStyle/>
-          <a:p>
-            <a:pPr marL="514350" indent="-514350">
-              <a:lnSpc>
-                <a:spcPct val="150000"/>
-              </a:lnSpc>
-              <a:buClr>
-                <a:schemeClr val="tx1"/>
-              </a:buClr>
-              <a:buFont typeface="Wingdings" panose="05000000000000000000" pitchFamily="2" charset="2"/>
-              <a:buChar char="§"/>
-            </a:pPr>
-            <a:r>
-              <a:rPr lang="en-US" sz="3600" dirty="0"/>
-              <a:t>Arrays: </a:t>
-            </a:r>
-            <a:r>
-              <a:rPr lang="en-US" sz="3600" dirty="0">
-                <a:solidFill>
-                  <a:srgbClr val="000000"/>
-                </a:solidFill>
-              </a:rPr>
-              <a:t>JavaScript arrays are used to store multiple values in a single variable.</a:t>
-            </a:r>
-            <a:endParaRPr lang="en-US" sz="3600" dirty="0"/>
-          </a:p>
-          <a:p>
-            <a:pPr marL="514350" indent="-514350">
-              <a:lnSpc>
-                <a:spcPct val="150000"/>
-              </a:lnSpc>
-              <a:buClr>
-                <a:schemeClr val="tx1"/>
-              </a:buClr>
-              <a:buFont typeface="Wingdings" panose="05000000000000000000" pitchFamily="2" charset="2"/>
-              <a:buChar char="§"/>
-            </a:pPr>
-            <a:r>
-              <a:rPr lang="en-US" sz="3600" dirty="0">
-                <a:solidFill>
-                  <a:srgbClr val="000000"/>
-                </a:solidFill>
-              </a:rPr>
-              <a:t>An array is a special variable, which can hold more than one value at a time.</a:t>
-            </a:r>
-          </a:p>
-          <a:p>
-            <a:pPr marL="514350" indent="-514350">
-              <a:lnSpc>
-                <a:spcPct val="150000"/>
-              </a:lnSpc>
-              <a:buClr>
-                <a:schemeClr val="tx1"/>
-              </a:buClr>
-              <a:buFont typeface="Wingdings" panose="05000000000000000000" pitchFamily="2" charset="2"/>
-              <a:buChar char="§"/>
-            </a:pPr>
-            <a:r>
-              <a:rPr lang="en-US" sz="3600" dirty="0"/>
-              <a:t>Arrays doesn’t support named indices.</a:t>
-            </a:r>
-          </a:p>
-          <a:p>
-            <a:pPr marL="514350" indent="-514350">
-              <a:lnSpc>
-                <a:spcPct val="150000"/>
-              </a:lnSpc>
-              <a:buClr>
-                <a:schemeClr val="tx1"/>
-              </a:buClr>
-              <a:buFont typeface="Wingdings" panose="05000000000000000000" pitchFamily="2" charset="2"/>
-              <a:buChar char="§"/>
-            </a:pPr>
-            <a:r>
-              <a:rPr lang="en-US" sz="3600" dirty="0"/>
-              <a:t>Arrays are basically special kind of object with numbered index.</a:t>
-            </a:r>
-          </a:p>
-          <a:p>
-            <a:pPr marL="514350" indent="-514350">
-              <a:lnSpc>
-                <a:spcPct val="150000"/>
-              </a:lnSpc>
-              <a:buClr>
-                <a:schemeClr val="tx1"/>
-              </a:buClr>
-              <a:buFont typeface="Wingdings" panose="05000000000000000000" pitchFamily="2" charset="2"/>
-              <a:buChar char="§"/>
-            </a:pPr>
-            <a:r>
-              <a:rPr lang="en-US" sz="3600" dirty="0"/>
-              <a:t>Return type of array and object is object.</a:t>
-            </a:r>
-          </a:p>
-        </p:txBody>
-      </p:sp>
-    </p:spTree>
-    <p:extLst>
-      <p:ext uri="{BB962C8B-B14F-4D97-AF65-F5344CB8AC3E}">
-        <p14:creationId xmlns:p14="http://schemas.microsoft.com/office/powerpoint/2010/main" val="534556464"/>
-      </p:ext>
-    </p:extLst>
-  </p:cSld>
-  <p:clrMapOvr>
-    <a:masterClrMapping/>
-  </p:clrMapOvr>
-</p:sld>
-</file>
-
-<file path=ppt/slides/slide4.xml><?xml version="1.0" encoding="utf-8"?>
-<p:sld xmlns:a="http://schemas.openxmlformats.org/drawingml/2006/main" xmlns:r="http://schemas.openxmlformats.org/officeDocument/2006/relationships" xmlns:p="http://schemas.openxmlformats.org/presentationml/2006/main">
-  <p:cSld>
-    <p:spTree>
-      <p:nvGrpSpPr>
-        <p:cNvPr id="1" name=""/>
-        <p:cNvGrpSpPr/>
-        <p:nvPr/>
-      </p:nvGrpSpPr>
-      <p:grpSpPr>
-        <a:xfrm>
-          <a:off x="0" y="0"/>
-          <a:ext cx="0" cy="0"/>
-          <a:chOff x="0" y="0"/>
-          <a:chExt cx="0" cy="0"/>
-        </a:xfrm>
-      </p:grpSpPr>
-      <p:pic>
-        <p:nvPicPr>
-          <p:cNvPr id="2" name="Picture 2"/>
-          <p:cNvPicPr>
-            <a:picLocks noChangeAspect="1"/>
-          </p:cNvPicPr>
-          <p:nvPr/>
-        </p:nvPicPr>
-        <p:blipFill>
-          <a:blip r:embed="rId2">
-            <a:alphaModFix amt="6000"/>
-            <a:extLst>
-              <a:ext uri="{28A0092B-C50C-407E-A947-70E740481C1C}">
-                <a14:useLocalDpi xmlns:a14="http://schemas.microsoft.com/office/drawing/2010/main" val="0"/>
-              </a:ext>
-              <a:ext uri="{96DAC541-7B7A-43D3-8B79-37D633B846F1}">
-                <asvg:svgBlip xmlns:asvg="http://schemas.microsoft.com/office/drawing/2016/SVG/main" r:embed="rId3"/>
-              </a:ext>
-            </a:extLst>
-          </a:blip>
-          <a:srcRect/>
-          <a:stretch>
-            <a:fillRect/>
-          </a:stretch>
-        </p:blipFill>
-        <p:spPr>
-          <a:xfrm flipH="1">
-            <a:off x="-19630" y="0"/>
-            <a:ext cx="2327622" cy="2327622"/>
-          </a:xfrm>
-          <a:prstGeom prst="rect">
-            <a:avLst/>
-          </a:prstGeom>
-        </p:spPr>
-      </p:pic>
-      <p:pic>
-        <p:nvPicPr>
-          <p:cNvPr id="3" name="Picture 3"/>
-          <p:cNvPicPr>
-            <a:picLocks noChangeAspect="1"/>
-          </p:cNvPicPr>
-          <p:nvPr/>
-        </p:nvPicPr>
-        <p:blipFill>
-          <a:blip r:embed="rId2" cstate="print">
-            <a:alphaModFix amt="6000"/>
-            <a:extLst>
-              <a:ext uri="{28A0092B-C50C-407E-A947-70E740481C1C}">
-                <a14:useLocalDpi xmlns:a14="http://schemas.microsoft.com/office/drawing/2010/main" val="0"/>
-              </a:ext>
-              <a:ext uri="{96DAC541-7B7A-43D3-8B79-37D633B846F1}">
-                <asvg:svgBlip xmlns:asvg="http://schemas.microsoft.com/office/drawing/2016/SVG/main" r:embed="rId3"/>
-              </a:ext>
-            </a:extLst>
-          </a:blip>
-          <a:srcRect/>
-          <a:stretch>
-            <a:fillRect/>
-          </a:stretch>
-        </p:blipFill>
-        <p:spPr>
-          <a:xfrm flipH="1">
-            <a:off x="16145912" y="8144912"/>
-            <a:ext cx="2142088" cy="2142088"/>
-          </a:xfrm>
-          <a:prstGeom prst="rect">
-            <a:avLst/>
-          </a:prstGeom>
-        </p:spPr>
-      </p:pic>
-      <p:grpSp>
-        <p:nvGrpSpPr>
-          <p:cNvPr id="4" name="Group 4"/>
-          <p:cNvGrpSpPr/>
-          <p:nvPr/>
-        </p:nvGrpSpPr>
-        <p:grpSpPr>
-          <a:xfrm>
-            <a:off x="17503442" y="0"/>
-            <a:ext cx="784558" cy="1829535"/>
-            <a:chOff x="0" y="0"/>
-            <a:chExt cx="286209" cy="667420"/>
-          </a:xfrm>
-        </p:grpSpPr>
-        <p:sp>
-          <p:nvSpPr>
-            <p:cNvPr id="5" name="Freeform 5"/>
-            <p:cNvSpPr/>
-            <p:nvPr/>
-          </p:nvSpPr>
-          <p:spPr>
-            <a:xfrm>
-              <a:off x="0" y="0"/>
-              <a:ext cx="286209" cy="667419"/>
-            </a:xfrm>
-            <a:custGeom>
-              <a:avLst/>
-              <a:gdLst/>
-              <a:ahLst/>
-              <a:cxnLst/>
-              <a:rect l="l" t="t" r="r" b="b"/>
-              <a:pathLst>
-                <a:path w="286209" h="667419">
-                  <a:moveTo>
-                    <a:pt x="0" y="0"/>
-                  </a:moveTo>
-                  <a:lnTo>
-                    <a:pt x="286209" y="0"/>
-                  </a:lnTo>
-                  <a:lnTo>
-                    <a:pt x="286209" y="667419"/>
-                  </a:lnTo>
-                  <a:lnTo>
-                    <a:pt x="0" y="667419"/>
-                  </a:lnTo>
-                  <a:close/>
-                </a:path>
-              </a:pathLst>
-            </a:custGeom>
-            <a:solidFill>
-              <a:srgbClr val="FF9D8F"/>
-            </a:solidFill>
-          </p:spPr>
-        </p:sp>
-      </p:grpSp>
-      <p:grpSp>
-        <p:nvGrpSpPr>
-          <p:cNvPr id="6" name="Group 6"/>
-          <p:cNvGrpSpPr/>
-          <p:nvPr/>
-        </p:nvGrpSpPr>
-        <p:grpSpPr>
-          <a:xfrm>
-            <a:off x="17503442" y="8909397"/>
-            <a:ext cx="784558" cy="2755206"/>
-            <a:chOff x="0" y="0"/>
-            <a:chExt cx="286209" cy="1005107"/>
-          </a:xfrm>
-        </p:grpSpPr>
-        <p:sp>
-          <p:nvSpPr>
-            <p:cNvPr id="7" name="Freeform 7"/>
-            <p:cNvSpPr/>
-            <p:nvPr/>
-          </p:nvSpPr>
-          <p:spPr>
-            <a:xfrm>
-              <a:off x="0" y="0"/>
-              <a:ext cx="286209" cy="1005107"/>
-            </a:xfrm>
-            <a:custGeom>
-              <a:avLst/>
-              <a:gdLst/>
-              <a:ahLst/>
-              <a:cxnLst/>
-              <a:rect l="l" t="t" r="r" b="b"/>
-              <a:pathLst>
-                <a:path w="286209" h="1005107">
-                  <a:moveTo>
-                    <a:pt x="0" y="0"/>
-                  </a:moveTo>
-                  <a:lnTo>
-                    <a:pt x="286209" y="0"/>
-                  </a:lnTo>
-                  <a:lnTo>
-                    <a:pt x="286209" y="1005107"/>
-                  </a:lnTo>
-                  <a:lnTo>
-                    <a:pt x="0" y="1005107"/>
-                  </a:lnTo>
-                  <a:close/>
-                </a:path>
-              </a:pathLst>
-            </a:custGeom>
-            <a:solidFill>
-              <a:srgbClr val="FFEAEA"/>
-            </a:solidFill>
-          </p:spPr>
-        </p:sp>
-      </p:grpSp>
-      <p:grpSp>
-        <p:nvGrpSpPr>
-          <p:cNvPr id="8" name="Group 8"/>
-          <p:cNvGrpSpPr/>
-          <p:nvPr/>
-        </p:nvGrpSpPr>
-        <p:grpSpPr>
-          <a:xfrm>
-            <a:off x="0" y="8494608"/>
-            <a:ext cx="1795264" cy="1792392"/>
-            <a:chOff x="0" y="0"/>
-            <a:chExt cx="6350000" cy="6339840"/>
-          </a:xfrm>
-        </p:grpSpPr>
-        <p:sp>
-          <p:nvSpPr>
-            <p:cNvPr id="9" name="Freeform 9"/>
-            <p:cNvSpPr/>
-            <p:nvPr/>
-          </p:nvSpPr>
-          <p:spPr>
-            <a:xfrm>
-              <a:off x="0" y="0"/>
-              <a:ext cx="6350000" cy="6339840"/>
-            </a:xfrm>
-            <a:custGeom>
-              <a:avLst/>
-              <a:gdLst/>
-              <a:ahLst/>
-              <a:cxnLst/>
-              <a:rect l="l" t="t" r="r" b="b"/>
-              <a:pathLst>
-                <a:path w="6350000" h="6339840">
-                  <a:moveTo>
-                    <a:pt x="6350000" y="6339840"/>
-                  </a:moveTo>
-                  <a:lnTo>
-                    <a:pt x="0" y="6339840"/>
-                  </a:lnTo>
-                  <a:lnTo>
-                    <a:pt x="0" y="0"/>
-                  </a:lnTo>
-                  <a:lnTo>
-                    <a:pt x="6350000" y="6339840"/>
-                  </a:lnTo>
-                  <a:close/>
-                </a:path>
-              </a:pathLst>
-            </a:custGeom>
-            <a:solidFill>
-              <a:srgbClr val="E6F0FF"/>
-            </a:solidFill>
-          </p:spPr>
-        </p:sp>
-      </p:grpSp>
-      <p:grpSp>
-        <p:nvGrpSpPr>
-          <p:cNvPr id="10" name="Group 10"/>
-          <p:cNvGrpSpPr/>
-          <p:nvPr/>
-        </p:nvGrpSpPr>
-        <p:grpSpPr>
-          <a:xfrm rot="5400000">
-            <a:off x="-21066" y="0"/>
-            <a:ext cx="1795264" cy="1792392"/>
-            <a:chOff x="0" y="0"/>
-            <a:chExt cx="6350000" cy="6339840"/>
-          </a:xfrm>
-        </p:grpSpPr>
-        <p:sp>
-          <p:nvSpPr>
-            <p:cNvPr id="11" name="Freeform 11"/>
-            <p:cNvSpPr/>
-            <p:nvPr/>
-          </p:nvSpPr>
-          <p:spPr>
-            <a:xfrm>
-              <a:off x="0" y="0"/>
-              <a:ext cx="6350000" cy="6339840"/>
-            </a:xfrm>
-            <a:custGeom>
-              <a:avLst/>
-              <a:gdLst/>
-              <a:ahLst/>
-              <a:cxnLst/>
-              <a:rect l="l" t="t" r="r" b="b"/>
-              <a:pathLst>
-                <a:path w="6350000" h="6339840">
-                  <a:moveTo>
-                    <a:pt x="6350000" y="6339840"/>
-                  </a:moveTo>
-                  <a:lnTo>
-                    <a:pt x="0" y="6339840"/>
-                  </a:lnTo>
-                  <a:lnTo>
-                    <a:pt x="0" y="0"/>
-                  </a:lnTo>
-                  <a:lnTo>
-                    <a:pt x="6350000" y="6339840"/>
-                  </a:lnTo>
-                  <a:close/>
-                </a:path>
-              </a:pathLst>
-            </a:custGeom>
-            <a:solidFill>
-              <a:srgbClr val="E6F0FF"/>
-            </a:solidFill>
-          </p:spPr>
-        </p:sp>
-      </p:grpSp>
-      <p:grpSp>
-        <p:nvGrpSpPr>
-          <p:cNvPr id="12" name="Group 12"/>
-          <p:cNvGrpSpPr/>
-          <p:nvPr/>
-        </p:nvGrpSpPr>
-        <p:grpSpPr>
-          <a:xfrm>
-            <a:off x="1028700" y="1363120"/>
-            <a:ext cx="7734300" cy="538098"/>
-            <a:chOff x="0" y="0"/>
-            <a:chExt cx="1876837" cy="166788"/>
-          </a:xfrm>
-        </p:grpSpPr>
-        <p:sp>
-          <p:nvSpPr>
-            <p:cNvPr id="13" name="Freeform 13"/>
-            <p:cNvSpPr/>
-            <p:nvPr/>
-          </p:nvSpPr>
-          <p:spPr>
-            <a:xfrm>
-              <a:off x="0" y="0"/>
-              <a:ext cx="1876837" cy="166788"/>
-            </a:xfrm>
-            <a:custGeom>
-              <a:avLst/>
-              <a:gdLst/>
-              <a:ahLst/>
-              <a:cxnLst/>
-              <a:rect l="l" t="t" r="r" b="b"/>
-              <a:pathLst>
-                <a:path w="1876837" h="166788">
-                  <a:moveTo>
-                    <a:pt x="0" y="0"/>
-                  </a:moveTo>
-                  <a:lnTo>
-                    <a:pt x="1876837" y="0"/>
-                  </a:lnTo>
-                  <a:lnTo>
-                    <a:pt x="1876837" y="166788"/>
-                  </a:lnTo>
-                  <a:lnTo>
-                    <a:pt x="0" y="166788"/>
-                  </a:lnTo>
-                  <a:close/>
-                </a:path>
-              </a:pathLst>
-            </a:custGeom>
-            <a:solidFill>
-              <a:srgbClr val="FFCFCF"/>
-            </a:solidFill>
-          </p:spPr>
-        </p:sp>
-      </p:grpSp>
-      <p:sp>
-        <p:nvSpPr>
-          <p:cNvPr id="16" name="TextBox 15">
-            <a:extLst>
-              <a:ext uri="{FF2B5EF4-FFF2-40B4-BE49-F238E27FC236}">
-                <a16:creationId xmlns:a16="http://schemas.microsoft.com/office/drawing/2014/main" id="{07F97D94-3FF9-950A-FFE1-A267F491BF58}"/>
-              </a:ext>
-            </a:extLst>
-          </p:cNvPr>
-          <p:cNvSpPr txBox="1"/>
-          <p:nvPr/>
-        </p:nvSpPr>
-        <p:spPr>
-          <a:xfrm>
             <a:off x="1013460" y="1220172"/>
             <a:ext cx="11391900" cy="1500411"/>
           </a:xfrm>
@@ -5838,7 +5304,7 @@
 </p:sld>
 </file>
 
-<file path=ppt/slides/slide5.xml><?xml version="1.0" encoding="utf-8"?>
+<file path=ppt/slides/slide4.xml><?xml version="1.0" encoding="utf-8"?>
 <p:sld xmlns:a="http://schemas.openxmlformats.org/drawingml/2006/main" xmlns:r="http://schemas.openxmlformats.org/officeDocument/2006/relationships" xmlns:p="http://schemas.openxmlformats.org/presentationml/2006/main">
   <p:cSld>
     <p:spTree>
@@ -6021,7 +5487,7 @@
 </p:sld>
 </file>
 
-<file path=ppt/slides/slide6.xml><?xml version="1.0" encoding="utf-8"?>
+<file path=ppt/slides/slide5.xml><?xml version="1.0" encoding="utf-8"?>
 <p:sld xmlns:a="http://schemas.openxmlformats.org/drawingml/2006/main" xmlns:r="http://schemas.openxmlformats.org/officeDocument/2006/relationships" xmlns:p="http://schemas.openxmlformats.org/presentationml/2006/main">
   <p:cSld>
     <p:spTree>

</xml_diff>